<commit_message>
fixed spelling error PPT
</commit_message>
<xml_diff>
--- a/Power_point.pptx
+++ b/Power_point.pptx
@@ -9619,10 +9619,10 @@
               <a:buNone/>
             </a:pPr>
             <a:r>
-              <a:rPr lang="en"/>
+              <a:rPr lang="en" dirty="0"/>
               <a:t>Feature Engineering</a:t>
             </a:r>
-            <a:endParaRPr/>
+            <a:endParaRPr dirty="0"/>
           </a:p>
         </p:txBody>
       </p:sp>
@@ -9691,20 +9691,12 @@
           <a:p>
             <a:pPr marL="285750" indent="-285750"/>
             <a:r>
-              <a:rPr lang="en-US" dirty="0" err="1">
-                <a:latin typeface="Roboto Slab" pitchFamily="2" charset="0"/>
-                <a:ea typeface="Roboto Slab" pitchFamily="2" charset="0"/>
-                <a:cs typeface="Roboto Slab" pitchFamily="2" charset="0"/>
-              </a:rPr>
-              <a:t>Logisitcal</a:t>
-            </a:r>
-            <a:r>
               <a:rPr lang="en-US" dirty="0">
                 <a:latin typeface="Roboto Slab" pitchFamily="2" charset="0"/>
                 <a:ea typeface="Roboto Slab" pitchFamily="2" charset="0"/>
                 <a:cs typeface="Roboto Slab" pitchFamily="2" charset="0"/>
               </a:rPr>
-              <a:t> Regression Model</a:t>
+              <a:t>Logistical Regression Model</a:t>
             </a:r>
           </a:p>
           <a:p>

</xml_diff>